<commit_message>
add Cubeman to scene
</commit_message>
<xml_diff>
--- a/Presentation/IntermediatePres.pptx
+++ b/Presentation/IntermediatePres.pptx
@@ -10,17 +10,20 @@
     <p:sldMasterId id="2147483697" r:id="rId6"/>
   </p:sldMasterIdLst>
   <p:notesMasterIdLst>
-    <p:notesMasterId r:id="rId12"/>
+    <p:notesMasterId r:id="rId15"/>
   </p:notesMasterIdLst>
   <p:handoutMasterIdLst>
-    <p:handoutMasterId r:id="rId13"/>
+    <p:handoutMasterId r:id="rId16"/>
   </p:handoutMasterIdLst>
   <p:sldIdLst>
     <p:sldId id="355" r:id="rId7"/>
     <p:sldId id="376" r:id="rId8"/>
     <p:sldId id="377" r:id="rId9"/>
-    <p:sldId id="378" r:id="rId10"/>
-    <p:sldId id="379" r:id="rId11"/>
+    <p:sldId id="380" r:id="rId10"/>
+    <p:sldId id="381" r:id="rId11"/>
+    <p:sldId id="378" r:id="rId12"/>
+    <p:sldId id="379" r:id="rId13"/>
+    <p:sldId id="382" r:id="rId14"/>
   </p:sldIdLst>
   <p:sldSz cx="9144000" cy="6858000" type="screen4x3"/>
   <p:notesSz cx="9925050" cy="6665913"/>
@@ -291,7 +294,7 @@
               <a:pPr>
                 <a:defRPr/>
               </a:pPr>
-              <a:t>02/01/2020</a:t>
+              <a:t>06/01/2020</a:t>
             </a:fld>
             <a:endParaRPr lang="en-GB" dirty="0"/>
           </a:p>
@@ -510,7 +513,7 @@
               <a:pPr>
                 <a:defRPr/>
               </a:pPr>
-              <a:t>02/01/2020</a:t>
+              <a:t>06/01/2020</a:t>
             </a:fld>
             <a:endParaRPr lang="en-GB"/>
           </a:p>
@@ -9540,7 +9543,7 @@
           <a:p>
             <a:r>
               <a:rPr lang="en-US"/>
-              <a:t>User Interface: Unity 3D for Display &amp; Interaction</a:t>
+              <a:t>We chosed Unity 3D for Displaying &amp; Interaction</a:t>
             </a:r>
           </a:p>
           <a:p>
@@ -9832,11 +9835,25 @@
               <a:lnSpc>
                 <a:spcPct val="150000"/>
               </a:lnSpc>
+              <a:buFontTx/>
               <a:buAutoNum type="arabicPeriod"/>
             </a:pPr>
             <a:r>
               <a:rPr lang="de-DE"/>
               <a:t>Create Interface/Levels in Unity</a:t>
+            </a:r>
+          </a:p>
+          <a:p>
+            <a:pPr marL="342900" indent="-342900">
+              <a:lnSpc>
+                <a:spcPct val="150000"/>
+              </a:lnSpc>
+              <a:buFontTx/>
+              <a:buAutoNum type="arabicPeriod"/>
+            </a:pPr>
+            <a:r>
+              <a:rPr lang="de-DE"/>
+              <a:t>Integrate deformable Mesh for virtual Character -&gt; SMPL Asset</a:t>
             </a:r>
           </a:p>
           <a:p>
@@ -9848,7 +9865,7 @@
             </a:pPr>
             <a:r>
               <a:rPr lang="de-DE"/>
-              <a:t>Implement Skeleton Tracking with Libraries to get Human Pose (Kinect SDK, Unity Kit)</a:t>
+              <a:t>Implement Skeleton Tracking with Libraries to get Human Pose -&gt; Kinect SDK, Unity Kit</a:t>
             </a:r>
           </a:p>
           <a:p>
@@ -9862,14 +9879,6 @@
               <a:rPr lang="de-DE"/>
               <a:t>Filtering per-frame poses over time for temporal Consistency	</a:t>
             </a:r>
-            <a:r>
-              <a:rPr lang="de-DE">
-                <a:solidFill>
-                  <a:srgbClr val="FF0000"/>
-                </a:solidFill>
-              </a:rPr>
-              <a:t>(formula Filtering!?)</a:t>
-            </a:r>
           </a:p>
           <a:p>
             <a:pPr marL="342900" indent="-342900">
@@ -9880,7 +9889,7 @@
             </a:pPr>
             <a:r>
               <a:rPr lang="de-DE"/>
-              <a:t>Get deformation of tracked Skeleton</a:t>
+              <a:t>Move the Avatar Bones according to tracking</a:t>
             </a:r>
           </a:p>
           <a:p>
@@ -9892,7 +9901,7 @@
             </a:pPr>
             <a:r>
               <a:rPr lang="de-DE"/>
-              <a:t>Integrate deformable Mesh for virtual Character (SMPL)</a:t>
+              <a:t> Use Avatar for deforming Mesh</a:t>
             </a:r>
           </a:p>
           <a:p>
@@ -9904,30 +9913,6 @@
             </a:pPr>
             <a:r>
               <a:rPr lang="de-DE"/>
-              <a:t>Transfer deformation of Skeleton to virtual Mesh vertices</a:t>
-            </a:r>
-          </a:p>
-          <a:p>
-            <a:pPr marL="342900" indent="-342900">
-              <a:lnSpc>
-                <a:spcPct val="150000"/>
-              </a:lnSpc>
-              <a:buAutoNum type="arabicPeriod"/>
-            </a:pPr>
-            <a:r>
-              <a:rPr lang="de-DE"/>
-              <a:t>Implement linear blend skinning to deform Model  </a:t>
-            </a:r>
-          </a:p>
-          <a:p>
-            <a:pPr marL="342900" indent="-342900">
-              <a:lnSpc>
-                <a:spcPct val="150000"/>
-              </a:lnSpc>
-              <a:buAutoNum type="arabicPeriod"/>
-            </a:pPr>
-            <a:r>
-              <a:rPr lang="de-DE"/>
               <a:t>Display tracked Skeleton and deformed Character Model</a:t>
             </a:r>
           </a:p>
@@ -9950,44 +9935,8 @@
           <a:p>
             <a:endParaRPr lang="de-DE"/>
           </a:p>
-          <a:p>
-            <a:r>
-              <a:rPr lang="de-DE"/>
-              <a:t>Extra: Dancing Game(getting points for pose imitation)</a:t>
-            </a:r>
-          </a:p>
-        </p:txBody>
-      </p:sp>
-      <p:pic>
-        <p:nvPicPr>
-          <p:cNvPr id="3" name="Grafik 2" descr="Ein Bild, das Objekt, Uhr enthält.&#10;&#10;Automatisch generierte Beschreibung">
-            <a:extLst>
-              <a:ext uri="{FF2B5EF4-FFF2-40B4-BE49-F238E27FC236}">
-                <a16:creationId xmlns:a16="http://schemas.microsoft.com/office/drawing/2014/main" id="{413A7135-06C9-4113-A1FA-C28CB8A3C91F}"/>
-              </a:ext>
-            </a:extLst>
-          </p:cNvPr>
-          <p:cNvPicPr>
-            <a:picLocks noChangeAspect="1"/>
-          </p:cNvPicPr>
-          <p:nvPr/>
-        </p:nvPicPr>
-        <p:blipFill>
-          <a:blip r:embed="rId2"/>
-          <a:stretch>
-            <a:fillRect/>
-          </a:stretch>
-        </p:blipFill>
-        <p:spPr>
-          <a:xfrm>
-            <a:off x="6168712" y="4243727"/>
-            <a:ext cx="1841081" cy="680589"/>
-          </a:xfrm>
-          <a:prstGeom prst="rect">
-            <a:avLst/>
-          </a:prstGeom>
-        </p:spPr>
-      </p:pic>
+        </p:txBody>
+      </p:sp>
     </p:spTree>
     <p:extLst>
       <p:ext uri="{BB962C8B-B14F-4D97-AF65-F5344CB8AC3E}">
@@ -10070,62 +10019,69 @@
           </a:p>
         </p:txBody>
       </p:sp>
-      <p:pic>
-        <p:nvPicPr>
-          <p:cNvPr id="3" name="Inhaltsplatzhalter 2" descr="Ein Bild, das Screenshot enthält.&#10;&#10;Automatisch generierte Beschreibung">
+      <p:sp>
+        <p:nvSpPr>
+          <p:cNvPr id="4" name="Titel 3"/>
+          <p:cNvSpPr>
+            <a:spLocks noGrp="1"/>
+          </p:cNvSpPr>
+          <p:nvPr>
+            <p:ph type="title"/>
+          </p:nvPr>
+        </p:nvSpPr>
+        <p:spPr/>
+        <p:txBody>
+          <a:bodyPr/>
+          <a:lstStyle/>
+          <a:p>
+            <a:r>
+              <a:rPr lang="de-DE"/>
+              <a:t>Kinect Manager</a:t>
+            </a:r>
+            <a:endParaRPr lang="de-DE" dirty="0"/>
+          </a:p>
+        </p:txBody>
+      </p:sp>
+      <p:sp>
+        <p:nvSpPr>
+          <p:cNvPr id="6" name="Textplatzhalter 5">
             <a:extLst>
               <a:ext uri="{FF2B5EF4-FFF2-40B4-BE49-F238E27FC236}">
-                <a16:creationId xmlns:a16="http://schemas.microsoft.com/office/drawing/2014/main" id="{EF1C01A6-8723-4789-9096-F31898B4A5AE}"/>
+                <a16:creationId xmlns:a16="http://schemas.microsoft.com/office/drawing/2014/main" id="{FBCFCD53-662A-4AEF-9949-6631F873F1CA}"/>
               </a:ext>
             </a:extLst>
           </p:cNvPr>
-          <p:cNvPicPr>
-            <a:picLocks noGrp="1" noChangeAspect="1"/>
-          </p:cNvPicPr>
-          <p:nvPr>
-            <p:ph sz="quarter" idx="18"/>
-          </p:nvPr>
-        </p:nvPicPr>
-        <p:blipFill>
-          <a:blip r:embed="rId2"/>
-          <a:stretch>
-            <a:fillRect/>
-          </a:stretch>
-        </p:blipFill>
+          <p:cNvSpPr>
+            <a:spLocks noGrp="1"/>
+          </p:cNvSpPr>
+          <p:nvPr>
+            <p:ph type="body" sz="quarter" idx="13"/>
+          </p:nvPr>
+        </p:nvSpPr>
         <p:spPr>
           <a:xfrm>
-            <a:off x="325200" y="1926049"/>
-            <a:ext cx="8509000" cy="2971265"/>
+            <a:off x="319089" y="1762188"/>
+            <a:ext cx="8508999" cy="4577066"/>
           </a:xfrm>
         </p:spPr>
-      </p:pic>
-      <p:sp>
-        <p:nvSpPr>
-          <p:cNvPr id="4" name="Titel 3"/>
-          <p:cNvSpPr>
-            <a:spLocks noGrp="1"/>
-          </p:cNvSpPr>
-          <p:nvPr>
-            <p:ph type="title"/>
-          </p:nvPr>
-        </p:nvSpPr>
-        <p:spPr/>
         <p:txBody>
           <a:bodyPr/>
           <a:lstStyle/>
           <a:p>
-            <a:r>
-              <a:rPr lang="de-DE"/>
-              <a:t>Pipeline</a:t>
-            </a:r>
-            <a:endParaRPr lang="de-DE" dirty="0"/>
+            <a:pPr marL="342900" indent="-342900">
+              <a:lnSpc>
+                <a:spcPct val="150000"/>
+              </a:lnSpc>
+              <a:buAutoNum type="arabicPeriod"/>
+            </a:pPr>
+            <a:endParaRPr lang="de-DE"/>
           </a:p>
         </p:txBody>
       </p:sp>
     </p:spTree>
     <p:extLst>
       <p:ext uri="{BB962C8B-B14F-4D97-AF65-F5344CB8AC3E}">
-        <p14:creationId xmlns:p14="http://schemas.microsoft.com/office/powerpoint/2010/main" val="3499384626"/>
+        <p14:creationId xmlns:p14="http://schemas.microsoft.com/office/powerpoint/2010/main" val="1073986191"/>
       </p:ext>
     </p:extLst>
   </p:cSld>
@@ -10206,6 +10162,281 @@
       </p:sp>
       <p:sp>
         <p:nvSpPr>
+          <p:cNvPr id="4" name="Titel 3"/>
+          <p:cNvSpPr>
+            <a:spLocks noGrp="1"/>
+          </p:cNvSpPr>
+          <p:nvPr>
+            <p:ph type="title"/>
+          </p:nvPr>
+        </p:nvSpPr>
+        <p:spPr/>
+        <p:txBody>
+          <a:bodyPr/>
+          <a:lstStyle/>
+          <a:p>
+            <a:r>
+              <a:rPr lang="de-DE"/>
+              <a:t>SMPL Model</a:t>
+            </a:r>
+            <a:endParaRPr lang="de-DE" dirty="0"/>
+          </a:p>
+        </p:txBody>
+      </p:sp>
+      <p:sp>
+        <p:nvSpPr>
+          <p:cNvPr id="6" name="Textplatzhalter 5">
+            <a:extLst>
+              <a:ext uri="{FF2B5EF4-FFF2-40B4-BE49-F238E27FC236}">
+                <a16:creationId xmlns:a16="http://schemas.microsoft.com/office/drawing/2014/main" id="{FBCFCD53-662A-4AEF-9949-6631F873F1CA}"/>
+              </a:ext>
+            </a:extLst>
+          </p:cNvPr>
+          <p:cNvSpPr>
+            <a:spLocks noGrp="1"/>
+          </p:cNvSpPr>
+          <p:nvPr>
+            <p:ph type="body" sz="quarter" idx="13"/>
+          </p:nvPr>
+        </p:nvSpPr>
+        <p:spPr>
+          <a:xfrm>
+            <a:off x="319089" y="1762188"/>
+            <a:ext cx="8508999" cy="4577066"/>
+          </a:xfrm>
+        </p:spPr>
+        <p:txBody>
+          <a:bodyPr/>
+          <a:lstStyle/>
+          <a:p>
+            <a:pPr marL="342900" indent="-342900">
+              <a:lnSpc>
+                <a:spcPct val="150000"/>
+              </a:lnSpc>
+              <a:buAutoNum type="arabicPeriod"/>
+            </a:pPr>
+            <a:endParaRPr lang="de-DE"/>
+          </a:p>
+        </p:txBody>
+      </p:sp>
+    </p:spTree>
+    <p:extLst>
+      <p:ext uri="{BB962C8B-B14F-4D97-AF65-F5344CB8AC3E}">
+        <p14:creationId xmlns:p14="http://schemas.microsoft.com/office/powerpoint/2010/main" val="3234394509"/>
+      </p:ext>
+    </p:extLst>
+  </p:cSld>
+  <p:clrMapOvr>
+    <a:masterClrMapping/>
+  </p:clrMapOvr>
+</p:sld>
+</file>
+
+<file path=ppt/slides/slide6.xml><?xml version="1.0" encoding="utf-8"?>
+<p:sld xmlns:a="http://schemas.openxmlformats.org/drawingml/2006/main" xmlns:r="http://schemas.openxmlformats.org/officeDocument/2006/relationships" xmlns:p="http://schemas.openxmlformats.org/presentationml/2006/main">
+  <p:cSld>
+    <p:spTree>
+      <p:nvGrpSpPr>
+        <p:cNvPr id="1" name=""/>
+        <p:cNvGrpSpPr/>
+        <p:nvPr/>
+      </p:nvGrpSpPr>
+      <p:grpSpPr>
+        <a:xfrm>
+          <a:off x="0" y="0"/>
+          <a:ext cx="0" cy="0"/>
+          <a:chOff x="0" y="0"/>
+          <a:chExt cx="0" cy="0"/>
+        </a:xfrm>
+      </p:grpSpPr>
+      <p:sp>
+        <p:nvSpPr>
+          <p:cNvPr id="5" name="Foliennummernplatzhalter 4"/>
+          <p:cNvSpPr>
+            <a:spLocks noGrp="1"/>
+          </p:cNvSpPr>
+          <p:nvPr>
+            <p:ph type="sldNum" sz="quarter" idx="15"/>
+          </p:nvPr>
+        </p:nvSpPr>
+        <p:spPr/>
+        <p:txBody>
+          <a:bodyPr/>
+          <a:lstStyle/>
+          <a:p>
+            <a:fld id="{CE58CB1E-F828-4F11-99E0-327109AF9DA4}" type="slidenum">
+              <a:rPr lang="de-DE" smtClean="0"/>
+              <a:pPr/>
+              <a:t>6</a:t>
+            </a:fld>
+            <a:endParaRPr lang="de-DE" dirty="0"/>
+          </a:p>
+        </p:txBody>
+      </p:sp>
+      <p:sp>
+        <p:nvSpPr>
+          <p:cNvPr id="10" name="Fußzeilenplatzhalter 4"/>
+          <p:cNvSpPr>
+            <a:spLocks noGrp="1"/>
+          </p:cNvSpPr>
+          <p:nvPr>
+            <p:ph type="ftr" sz="quarter" idx="16"/>
+          </p:nvPr>
+        </p:nvSpPr>
+        <p:spPr>
+          <a:xfrm>
+            <a:off x="311161" y="6473313"/>
+            <a:ext cx="8287715" cy="365125"/>
+          </a:xfrm>
+        </p:spPr>
+        <p:txBody>
+          <a:bodyPr/>
+          <a:lstStyle/>
+          <a:p>
+            <a:r>
+              <a:rPr lang="de-DE"/>
+              <a:t>3D Scanning &amp; Motion Capture | Intermediate Presentation | Group 5 | Human Pose Estimation | 08.01.2020</a:t>
+            </a:r>
+            <a:endParaRPr lang="en-US" dirty="0"/>
+          </a:p>
+        </p:txBody>
+      </p:sp>
+      <p:pic>
+        <p:nvPicPr>
+          <p:cNvPr id="3" name="Inhaltsplatzhalter 2" descr="Ein Bild, das Screenshot enthält.&#10;&#10;Automatisch generierte Beschreibung">
+            <a:extLst>
+              <a:ext uri="{FF2B5EF4-FFF2-40B4-BE49-F238E27FC236}">
+                <a16:creationId xmlns:a16="http://schemas.microsoft.com/office/drawing/2014/main" id="{EF1C01A6-8723-4789-9096-F31898B4A5AE}"/>
+              </a:ext>
+            </a:extLst>
+          </p:cNvPr>
+          <p:cNvPicPr>
+            <a:picLocks noGrp="1" noChangeAspect="1"/>
+          </p:cNvPicPr>
+          <p:nvPr>
+            <p:ph sz="quarter" idx="18"/>
+          </p:nvPr>
+        </p:nvPicPr>
+        <p:blipFill>
+          <a:blip r:embed="rId2"/>
+          <a:stretch>
+            <a:fillRect/>
+          </a:stretch>
+        </p:blipFill>
+        <p:spPr>
+          <a:xfrm>
+            <a:off x="325200" y="1926049"/>
+            <a:ext cx="8509000" cy="2971265"/>
+          </a:xfrm>
+        </p:spPr>
+      </p:pic>
+      <p:sp>
+        <p:nvSpPr>
+          <p:cNvPr id="4" name="Titel 3"/>
+          <p:cNvSpPr>
+            <a:spLocks noGrp="1"/>
+          </p:cNvSpPr>
+          <p:nvPr>
+            <p:ph type="title"/>
+          </p:nvPr>
+        </p:nvSpPr>
+        <p:spPr/>
+        <p:txBody>
+          <a:bodyPr/>
+          <a:lstStyle/>
+          <a:p>
+            <a:r>
+              <a:rPr lang="de-DE"/>
+              <a:t>Pipeline</a:t>
+            </a:r>
+            <a:endParaRPr lang="de-DE" dirty="0"/>
+          </a:p>
+        </p:txBody>
+      </p:sp>
+    </p:spTree>
+    <p:extLst>
+      <p:ext uri="{BB962C8B-B14F-4D97-AF65-F5344CB8AC3E}">
+        <p14:creationId xmlns:p14="http://schemas.microsoft.com/office/powerpoint/2010/main" val="3499384626"/>
+      </p:ext>
+    </p:extLst>
+  </p:cSld>
+  <p:clrMapOvr>
+    <a:masterClrMapping/>
+  </p:clrMapOvr>
+</p:sld>
+</file>
+
+<file path=ppt/slides/slide7.xml><?xml version="1.0" encoding="utf-8"?>
+<p:sld xmlns:a="http://schemas.openxmlformats.org/drawingml/2006/main" xmlns:r="http://schemas.openxmlformats.org/officeDocument/2006/relationships" xmlns:p="http://schemas.openxmlformats.org/presentationml/2006/main">
+  <p:cSld>
+    <p:spTree>
+      <p:nvGrpSpPr>
+        <p:cNvPr id="1" name=""/>
+        <p:cNvGrpSpPr/>
+        <p:nvPr/>
+      </p:nvGrpSpPr>
+      <p:grpSpPr>
+        <a:xfrm>
+          <a:off x="0" y="0"/>
+          <a:ext cx="0" cy="0"/>
+          <a:chOff x="0" y="0"/>
+          <a:chExt cx="0" cy="0"/>
+        </a:xfrm>
+      </p:grpSpPr>
+      <p:sp>
+        <p:nvSpPr>
+          <p:cNvPr id="5" name="Foliennummernplatzhalter 4"/>
+          <p:cNvSpPr>
+            <a:spLocks noGrp="1"/>
+          </p:cNvSpPr>
+          <p:nvPr>
+            <p:ph type="sldNum" sz="quarter" idx="15"/>
+          </p:nvPr>
+        </p:nvSpPr>
+        <p:spPr/>
+        <p:txBody>
+          <a:bodyPr/>
+          <a:lstStyle/>
+          <a:p>
+            <a:fld id="{CE58CB1E-F828-4F11-99E0-327109AF9DA4}" type="slidenum">
+              <a:rPr lang="de-DE" smtClean="0"/>
+              <a:pPr/>
+              <a:t>7</a:t>
+            </a:fld>
+            <a:endParaRPr lang="de-DE" dirty="0"/>
+          </a:p>
+        </p:txBody>
+      </p:sp>
+      <p:sp>
+        <p:nvSpPr>
+          <p:cNvPr id="10" name="Fußzeilenplatzhalter 4"/>
+          <p:cNvSpPr>
+            <a:spLocks noGrp="1"/>
+          </p:cNvSpPr>
+          <p:nvPr>
+            <p:ph type="ftr" sz="quarter" idx="16"/>
+          </p:nvPr>
+        </p:nvSpPr>
+        <p:spPr>
+          <a:xfrm>
+            <a:off x="311161" y="6473313"/>
+            <a:ext cx="8287715" cy="365125"/>
+          </a:xfrm>
+        </p:spPr>
+        <p:txBody>
+          <a:bodyPr/>
+          <a:lstStyle/>
+          <a:p>
+            <a:r>
+              <a:rPr lang="de-DE"/>
+              <a:t>3D Scanning &amp; Motion Capture | Intermediate Presentation | Group 5 | Human Pose Estimation | 08.01.2020</a:t>
+            </a:r>
+            <a:endParaRPr lang="en-US" dirty="0"/>
+          </a:p>
+        </p:txBody>
+      </p:sp>
+      <p:sp>
+        <p:nvSpPr>
           <p:cNvPr id="22" name="Inhaltsplatzhalter 21"/>
           <p:cNvSpPr>
             <a:spLocks noGrp="1"/>
@@ -10255,6 +10486,162 @@
     <p:extLst>
       <p:ext uri="{BB962C8B-B14F-4D97-AF65-F5344CB8AC3E}">
         <p14:creationId xmlns:p14="http://schemas.microsoft.com/office/powerpoint/2010/main" val="1008777298"/>
+      </p:ext>
+    </p:extLst>
+  </p:cSld>
+  <p:clrMapOvr>
+    <a:masterClrMapping/>
+  </p:clrMapOvr>
+</p:sld>
+</file>
+
+<file path=ppt/slides/slide8.xml><?xml version="1.0" encoding="utf-8"?>
+<p:sld xmlns:a="http://schemas.openxmlformats.org/drawingml/2006/main" xmlns:r="http://schemas.openxmlformats.org/officeDocument/2006/relationships" xmlns:p="http://schemas.openxmlformats.org/presentationml/2006/main">
+  <p:cSld>
+    <p:spTree>
+      <p:nvGrpSpPr>
+        <p:cNvPr id="1" name=""/>
+        <p:cNvGrpSpPr/>
+        <p:nvPr/>
+      </p:nvGrpSpPr>
+      <p:grpSpPr>
+        <a:xfrm>
+          <a:off x="0" y="0"/>
+          <a:ext cx="0" cy="0"/>
+          <a:chOff x="0" y="0"/>
+          <a:chExt cx="0" cy="0"/>
+        </a:xfrm>
+      </p:grpSpPr>
+      <p:sp>
+        <p:nvSpPr>
+          <p:cNvPr id="5" name="Foliennummernplatzhalter 4"/>
+          <p:cNvSpPr>
+            <a:spLocks noGrp="1"/>
+          </p:cNvSpPr>
+          <p:nvPr>
+            <p:ph type="sldNum" sz="quarter" idx="15"/>
+          </p:nvPr>
+        </p:nvSpPr>
+        <p:spPr/>
+        <p:txBody>
+          <a:bodyPr/>
+          <a:lstStyle/>
+          <a:p>
+            <a:fld id="{CE58CB1E-F828-4F11-99E0-327109AF9DA4}" type="slidenum">
+              <a:rPr lang="de-DE" smtClean="0"/>
+              <a:pPr/>
+              <a:t>8</a:t>
+            </a:fld>
+            <a:endParaRPr lang="de-DE" dirty="0"/>
+          </a:p>
+        </p:txBody>
+      </p:sp>
+      <p:sp>
+        <p:nvSpPr>
+          <p:cNvPr id="10" name="Fußzeilenplatzhalter 4"/>
+          <p:cNvSpPr>
+            <a:spLocks noGrp="1"/>
+          </p:cNvSpPr>
+          <p:nvPr>
+            <p:ph type="ftr" sz="quarter" idx="16"/>
+          </p:nvPr>
+        </p:nvSpPr>
+        <p:spPr>
+          <a:xfrm>
+            <a:off x="311161" y="6473313"/>
+            <a:ext cx="8287715" cy="365125"/>
+          </a:xfrm>
+        </p:spPr>
+        <p:txBody>
+          <a:bodyPr/>
+          <a:lstStyle/>
+          <a:p>
+            <a:r>
+              <a:rPr lang="de-DE"/>
+              <a:t>3D Scanning &amp; Motion Capture | Intermediate Presentation | Group 5 | Human Pose Estimation | 08.01.2020</a:t>
+            </a:r>
+            <a:endParaRPr lang="en-US" dirty="0"/>
+          </a:p>
+        </p:txBody>
+      </p:sp>
+      <p:sp>
+        <p:nvSpPr>
+          <p:cNvPr id="22" name="Inhaltsplatzhalter 21"/>
+          <p:cNvSpPr>
+            <a:spLocks noGrp="1"/>
+          </p:cNvSpPr>
+          <p:nvPr>
+            <p:ph sz="quarter" idx="18"/>
+          </p:nvPr>
+        </p:nvSpPr>
+        <p:spPr>
+          <a:xfrm>
+            <a:off x="311161" y="1631147"/>
+            <a:ext cx="8287714" cy="4620184"/>
+          </a:xfrm>
+        </p:spPr>
+        <p:txBody>
+          <a:bodyPr/>
+          <a:lstStyle/>
+          <a:p>
+            <a:pPr marL="285750" indent="-285750">
+              <a:buFont typeface="Symbol" panose="05050102010706020507" pitchFamily="18" charset="2"/>
+              <a:buChar char="-"/>
+            </a:pPr>
+            <a:r>
+              <a:rPr lang="de-DE"/>
+              <a:t>Filtering for temporal coherence</a:t>
+            </a:r>
+          </a:p>
+          <a:p>
+            <a:pPr marL="285750" indent="-285750">
+              <a:buFont typeface="Symbol" panose="05050102010706020507" pitchFamily="18" charset="2"/>
+              <a:buChar char="-"/>
+            </a:pPr>
+            <a:r>
+              <a:rPr lang="de-DE"/>
+              <a:t>Gestures</a:t>
+            </a:r>
+          </a:p>
+          <a:p>
+            <a:pPr marL="285750" indent="-285750">
+              <a:buFont typeface="Symbol" panose="05050102010706020507" pitchFamily="18" charset="2"/>
+              <a:buChar char="-"/>
+            </a:pPr>
+            <a:r>
+              <a:rPr lang="de-DE"/>
+              <a:t>Make Dancing Game </a:t>
+            </a:r>
+          </a:p>
+        </p:txBody>
+      </p:sp>
+      <p:sp>
+        <p:nvSpPr>
+          <p:cNvPr id="4" name="Titel 3"/>
+          <p:cNvSpPr>
+            <a:spLocks noGrp="1"/>
+          </p:cNvSpPr>
+          <p:nvPr>
+            <p:ph type="title"/>
+          </p:nvPr>
+        </p:nvSpPr>
+        <p:spPr/>
+        <p:txBody>
+          <a:bodyPr/>
+          <a:lstStyle/>
+          <a:p>
+            <a:r>
+              <a:rPr lang="de-DE"/>
+              <a:t>Future Steps</a:t>
+            </a:r>
+            <a:endParaRPr lang="de-DE" dirty="0"/>
+          </a:p>
+        </p:txBody>
+      </p:sp>
+    </p:spTree>
+    <p:extLst>
+      <p:ext uri="{BB962C8B-B14F-4D97-AF65-F5344CB8AC3E}">
+        <p14:creationId xmlns:p14="http://schemas.microsoft.com/office/powerpoint/2010/main" val="2263011971"/>
       </p:ext>
     </p:extLst>
   </p:cSld>

</xml_diff>